<commit_message>
Add ajustments to the final PowerPoint Presentation
</commit_message>
<xml_diff>
--- a/recources/Final_Presentation.pptx
+++ b/recources/Final_Presentation.pptx
@@ -211,7 +211,7 @@
           <a:p>
             <a:fld id="{007CA374-B85D-4D42-9863-F3114FAED67B}" type="datetimeFigureOut">
               <a:rPr lang="en-CH" smtClean="0"/>
-              <a:t>01/18/2025</a:t>
+              <a:t>01/20/2025</a:t>
             </a:fld>
             <a:endParaRPr lang="en-CH"/>
           </a:p>
@@ -628,7 +628,7 @@
           <a:p>
             <a:fld id="{EE0C7D1E-2B42-4CCE-B486-B0C46991BC95}" type="datetimeFigureOut">
               <a:rPr lang="en-CH" smtClean="0"/>
-              <a:t>01/18/2025</a:t>
+              <a:t>01/20/2025</a:t>
             </a:fld>
             <a:endParaRPr lang="en-CH"/>
           </a:p>
@@ -828,7 +828,7 @@
           <a:p>
             <a:fld id="{EE0C7D1E-2B42-4CCE-B486-B0C46991BC95}" type="datetimeFigureOut">
               <a:rPr lang="en-CH" smtClean="0"/>
-              <a:t>01/18/2025</a:t>
+              <a:t>01/20/2025</a:t>
             </a:fld>
             <a:endParaRPr lang="en-CH"/>
           </a:p>
@@ -1038,7 +1038,7 @@
           <a:p>
             <a:fld id="{EE0C7D1E-2B42-4CCE-B486-B0C46991BC95}" type="datetimeFigureOut">
               <a:rPr lang="en-CH" smtClean="0"/>
-              <a:t>01/18/2025</a:t>
+              <a:t>01/20/2025</a:t>
             </a:fld>
             <a:endParaRPr lang="en-CH"/>
           </a:p>
@@ -1238,7 +1238,7 @@
           <a:p>
             <a:fld id="{EE0C7D1E-2B42-4CCE-B486-B0C46991BC95}" type="datetimeFigureOut">
               <a:rPr lang="en-CH" smtClean="0"/>
-              <a:t>01/18/2025</a:t>
+              <a:t>01/20/2025</a:t>
             </a:fld>
             <a:endParaRPr lang="en-CH"/>
           </a:p>
@@ -1514,7 +1514,7 @@
           <a:p>
             <a:fld id="{EE0C7D1E-2B42-4CCE-B486-B0C46991BC95}" type="datetimeFigureOut">
               <a:rPr lang="en-CH" smtClean="0"/>
-              <a:t>01/18/2025</a:t>
+              <a:t>01/20/2025</a:t>
             </a:fld>
             <a:endParaRPr lang="en-CH"/>
           </a:p>
@@ -1782,7 +1782,7 @@
           <a:p>
             <a:fld id="{EE0C7D1E-2B42-4CCE-B486-B0C46991BC95}" type="datetimeFigureOut">
               <a:rPr lang="en-CH" smtClean="0"/>
-              <a:t>01/18/2025</a:t>
+              <a:t>01/20/2025</a:t>
             </a:fld>
             <a:endParaRPr lang="en-CH"/>
           </a:p>
@@ -2197,7 +2197,7 @@
           <a:p>
             <a:fld id="{EE0C7D1E-2B42-4CCE-B486-B0C46991BC95}" type="datetimeFigureOut">
               <a:rPr lang="en-CH" smtClean="0"/>
-              <a:t>01/18/2025</a:t>
+              <a:t>01/20/2025</a:t>
             </a:fld>
             <a:endParaRPr lang="en-CH"/>
           </a:p>
@@ -2339,7 +2339,7 @@
           <a:p>
             <a:fld id="{EE0C7D1E-2B42-4CCE-B486-B0C46991BC95}" type="datetimeFigureOut">
               <a:rPr lang="en-CH" smtClean="0"/>
-              <a:t>01/18/2025</a:t>
+              <a:t>01/20/2025</a:t>
             </a:fld>
             <a:endParaRPr lang="en-CH"/>
           </a:p>
@@ -2452,7 +2452,7 @@
           <a:p>
             <a:fld id="{EE0C7D1E-2B42-4CCE-B486-B0C46991BC95}" type="datetimeFigureOut">
               <a:rPr lang="en-CH" smtClean="0"/>
-              <a:t>01/18/2025</a:t>
+              <a:t>01/20/2025</a:t>
             </a:fld>
             <a:endParaRPr lang="en-CH"/>
           </a:p>
@@ -2765,7 +2765,7 @@
           <a:p>
             <a:fld id="{EE0C7D1E-2B42-4CCE-B486-B0C46991BC95}" type="datetimeFigureOut">
               <a:rPr lang="en-CH" smtClean="0"/>
-              <a:t>01/18/2025</a:t>
+              <a:t>01/20/2025</a:t>
             </a:fld>
             <a:endParaRPr lang="en-CH"/>
           </a:p>
@@ -3054,7 +3054,7 @@
           <a:p>
             <a:fld id="{EE0C7D1E-2B42-4CCE-B486-B0C46991BC95}" type="datetimeFigureOut">
               <a:rPr lang="en-CH" smtClean="0"/>
-              <a:t>01/18/2025</a:t>
+              <a:t>01/20/2025</a:t>
             </a:fld>
             <a:endParaRPr lang="en-CH"/>
           </a:p>
@@ -3297,7 +3297,7 @@
           <a:p>
             <a:fld id="{EE0C7D1E-2B42-4CCE-B486-B0C46991BC95}" type="datetimeFigureOut">
               <a:rPr lang="en-CH" smtClean="0"/>
-              <a:t>01/18/2025</a:t>
+              <a:t>01/20/2025</a:t>
             </a:fld>
             <a:endParaRPr lang="en-CH"/>
           </a:p>
@@ -4749,19 +4749,19 @@
           <a:p>
             <a:r>
               <a:rPr lang="en-US" dirty="0"/>
-              <a:t>Input and visual design: Alex </a:t>
+              <a:t>Alex: Input, visual design and displaying images. </a:t>
             </a:r>
           </a:p>
           <a:p>
             <a:r>
               <a:rPr lang="en-US" dirty="0"/>
-              <a:t>Visual output on prototype and porting: Pascal </a:t>
+              <a:t>Pascal: Visual output and porting. </a:t>
             </a:r>
           </a:p>
           <a:p>
             <a:r>
               <a:rPr lang="en-US" dirty="0"/>
-              <a:t>Game Logic: Frederic and </a:t>
+              <a:t>Frederic and </a:t>
             </a:r>
             <a:r>
               <a:rPr lang="en-US" dirty="0" err="1"/>
@@ -4769,15 +4769,46 @@
             </a:r>
             <a:r>
               <a:rPr lang="en-US" dirty="0"/>
+              <a:t>: Game logic and audio.</a:t>
+            </a:r>
+          </a:p>
+          <a:p>
+            <a:r>
+              <a:rPr lang="fr-FR" dirty="0"/>
+              <a:t>The </a:t>
+            </a:r>
+            <a:r>
+              <a:rPr lang="fr-FR" dirty="0" err="1"/>
+              <a:t>rest</a:t>
+            </a:r>
+            <a:r>
+              <a:rPr lang="fr-FR" dirty="0"/>
               <a:t> </a:t>
             </a:r>
-          </a:p>
-          <a:p>
-            <a:r>
-              <a:rPr lang="en-US" dirty="0"/>
-              <a:t>Hardware, housing and music choice: Everyone</a:t>
-            </a:r>
-            <a:endParaRPr lang="fr-FR" dirty="0"/>
+            <a:r>
+              <a:rPr lang="fr-FR" dirty="0" err="1"/>
+              <a:t>was</a:t>
+            </a:r>
+            <a:r>
+              <a:rPr lang="fr-FR" dirty="0"/>
+              <a:t> </a:t>
+            </a:r>
+            <a:r>
+              <a:rPr lang="fr-FR" dirty="0" err="1"/>
+              <a:t>worked</a:t>
+            </a:r>
+            <a:r>
+              <a:rPr lang="fr-FR" dirty="0"/>
+              <a:t> on by the </a:t>
+            </a:r>
+            <a:r>
+              <a:rPr lang="fr-FR" dirty="0" err="1"/>
+              <a:t>whole</a:t>
+            </a:r>
+            <a:r>
+              <a:rPr lang="fr-FR" dirty="0"/>
+              <a:t> team.</a:t>
+            </a:r>
           </a:p>
         </p:txBody>
       </p:sp>

</xml_diff>

<commit_message>
Add pictures to the final PowerPoint Presentation
</commit_message>
<xml_diff>
--- a/recources/Final_Presentation.pptx
+++ b/recources/Final_Presentation.pptx
@@ -211,7 +211,7 @@
           <a:p>
             <a:fld id="{007CA374-B85D-4D42-9863-F3114FAED67B}" type="datetimeFigureOut">
               <a:rPr lang="en-CH" smtClean="0"/>
-              <a:t>01/20/2025</a:t>
+              <a:t>01/21/2025</a:t>
             </a:fld>
             <a:endParaRPr lang="en-CH"/>
           </a:p>
@@ -479,6 +479,90 @@
 </p:notesMaster>
 </file>
 
+<file path=ppt/notesSlides/notesSlide1.xml><?xml version="1.0" encoding="utf-8"?>
+<p:notes xmlns:a="http://schemas.openxmlformats.org/drawingml/2006/main" xmlns:r="http://schemas.openxmlformats.org/officeDocument/2006/relationships" xmlns:p="http://schemas.openxmlformats.org/presentationml/2006/main">
+  <p:cSld>
+    <p:spTree>
+      <p:nvGrpSpPr>
+        <p:cNvPr id="1" name=""/>
+        <p:cNvGrpSpPr/>
+        <p:nvPr/>
+      </p:nvGrpSpPr>
+      <p:grpSpPr>
+        <a:xfrm>
+          <a:off x="0" y="0"/>
+          <a:ext cx="0" cy="0"/>
+          <a:chOff x="0" y="0"/>
+          <a:chExt cx="0" cy="0"/>
+        </a:xfrm>
+      </p:grpSpPr>
+      <p:sp>
+        <p:nvSpPr>
+          <p:cNvPr id="2" name="Espace réservé de l'image des diapositives 1"/>
+          <p:cNvSpPr>
+            <a:spLocks noGrp="1" noRot="1" noChangeAspect="1"/>
+          </p:cNvSpPr>
+          <p:nvPr>
+            <p:ph type="sldImg"/>
+          </p:nvPr>
+        </p:nvSpPr>
+        <p:spPr/>
+      </p:sp>
+      <p:sp>
+        <p:nvSpPr>
+          <p:cNvPr id="3" name="Espace réservé des notes 2"/>
+          <p:cNvSpPr>
+            <a:spLocks noGrp="1"/>
+          </p:cNvSpPr>
+          <p:nvPr>
+            <p:ph type="body" idx="1"/>
+          </p:nvPr>
+        </p:nvSpPr>
+        <p:spPr/>
+        <p:txBody>
+          <a:bodyPr/>
+          <a:lstStyle/>
+          <a:p>
+            <a:endParaRPr lang="fr-CH" dirty="0"/>
+          </a:p>
+        </p:txBody>
+      </p:sp>
+      <p:sp>
+        <p:nvSpPr>
+          <p:cNvPr id="4" name="Espace réservé du numéro de diapositive 3"/>
+          <p:cNvSpPr>
+            <a:spLocks noGrp="1"/>
+          </p:cNvSpPr>
+          <p:nvPr>
+            <p:ph type="sldNum" sz="quarter" idx="5"/>
+          </p:nvPr>
+        </p:nvSpPr>
+        <p:spPr/>
+        <p:txBody>
+          <a:bodyPr/>
+          <a:lstStyle/>
+          <a:p>
+            <a:fld id="{7E03B4F7-94E0-4A68-980F-C217344412C8}" type="slidenum">
+              <a:rPr lang="en-CH" smtClean="0"/>
+              <a:t>2</a:t>
+            </a:fld>
+            <a:endParaRPr lang="en-CH"/>
+          </a:p>
+        </p:txBody>
+      </p:sp>
+    </p:spTree>
+    <p:extLst>
+      <p:ext uri="{BB962C8B-B14F-4D97-AF65-F5344CB8AC3E}">
+        <p14:creationId xmlns:p14="http://schemas.microsoft.com/office/powerpoint/2010/main" val="2190206979"/>
+      </p:ext>
+    </p:extLst>
+  </p:cSld>
+  <p:clrMapOvr>
+    <a:masterClrMapping/>
+  </p:clrMapOvr>
+</p:notes>
+</file>
+
 <file path=ppt/slideLayouts/slideLayout1.xml><?xml version="1.0" encoding="utf-8"?>
 <p:sldLayout xmlns:a="http://schemas.openxmlformats.org/drawingml/2006/main" xmlns:r="http://schemas.openxmlformats.org/officeDocument/2006/relationships" xmlns:p="http://schemas.openxmlformats.org/presentationml/2006/main" type="title" preserve="1">
   <p:cSld name="Title Slide">
@@ -628,7 +712,7 @@
           <a:p>
             <a:fld id="{EE0C7D1E-2B42-4CCE-B486-B0C46991BC95}" type="datetimeFigureOut">
               <a:rPr lang="en-CH" smtClean="0"/>
-              <a:t>01/20/2025</a:t>
+              <a:t>01/21/2025</a:t>
             </a:fld>
             <a:endParaRPr lang="en-CH"/>
           </a:p>
@@ -828,7 +912,7 @@
           <a:p>
             <a:fld id="{EE0C7D1E-2B42-4CCE-B486-B0C46991BC95}" type="datetimeFigureOut">
               <a:rPr lang="en-CH" smtClean="0"/>
-              <a:t>01/20/2025</a:t>
+              <a:t>01/21/2025</a:t>
             </a:fld>
             <a:endParaRPr lang="en-CH"/>
           </a:p>
@@ -1038,7 +1122,7 @@
           <a:p>
             <a:fld id="{EE0C7D1E-2B42-4CCE-B486-B0C46991BC95}" type="datetimeFigureOut">
               <a:rPr lang="en-CH" smtClean="0"/>
-              <a:t>01/20/2025</a:t>
+              <a:t>01/21/2025</a:t>
             </a:fld>
             <a:endParaRPr lang="en-CH"/>
           </a:p>
@@ -1238,7 +1322,7 @@
           <a:p>
             <a:fld id="{EE0C7D1E-2B42-4CCE-B486-B0C46991BC95}" type="datetimeFigureOut">
               <a:rPr lang="en-CH" smtClean="0"/>
-              <a:t>01/20/2025</a:t>
+              <a:t>01/21/2025</a:t>
             </a:fld>
             <a:endParaRPr lang="en-CH"/>
           </a:p>
@@ -1514,7 +1598,7 @@
           <a:p>
             <a:fld id="{EE0C7D1E-2B42-4CCE-B486-B0C46991BC95}" type="datetimeFigureOut">
               <a:rPr lang="en-CH" smtClean="0"/>
-              <a:t>01/20/2025</a:t>
+              <a:t>01/21/2025</a:t>
             </a:fld>
             <a:endParaRPr lang="en-CH"/>
           </a:p>
@@ -1782,7 +1866,7 @@
           <a:p>
             <a:fld id="{EE0C7D1E-2B42-4CCE-B486-B0C46991BC95}" type="datetimeFigureOut">
               <a:rPr lang="en-CH" smtClean="0"/>
-              <a:t>01/20/2025</a:t>
+              <a:t>01/21/2025</a:t>
             </a:fld>
             <a:endParaRPr lang="en-CH"/>
           </a:p>
@@ -2197,7 +2281,7 @@
           <a:p>
             <a:fld id="{EE0C7D1E-2B42-4CCE-B486-B0C46991BC95}" type="datetimeFigureOut">
               <a:rPr lang="en-CH" smtClean="0"/>
-              <a:t>01/20/2025</a:t>
+              <a:t>01/21/2025</a:t>
             </a:fld>
             <a:endParaRPr lang="en-CH"/>
           </a:p>
@@ -2339,7 +2423,7 @@
           <a:p>
             <a:fld id="{EE0C7D1E-2B42-4CCE-B486-B0C46991BC95}" type="datetimeFigureOut">
               <a:rPr lang="en-CH" smtClean="0"/>
-              <a:t>01/20/2025</a:t>
+              <a:t>01/21/2025</a:t>
             </a:fld>
             <a:endParaRPr lang="en-CH"/>
           </a:p>
@@ -2452,7 +2536,7 @@
           <a:p>
             <a:fld id="{EE0C7D1E-2B42-4CCE-B486-B0C46991BC95}" type="datetimeFigureOut">
               <a:rPr lang="en-CH" smtClean="0"/>
-              <a:t>01/20/2025</a:t>
+              <a:t>01/21/2025</a:t>
             </a:fld>
             <a:endParaRPr lang="en-CH"/>
           </a:p>
@@ -2765,7 +2849,7 @@
           <a:p>
             <a:fld id="{EE0C7D1E-2B42-4CCE-B486-B0C46991BC95}" type="datetimeFigureOut">
               <a:rPr lang="en-CH" smtClean="0"/>
-              <a:t>01/20/2025</a:t>
+              <a:t>01/21/2025</a:t>
             </a:fld>
             <a:endParaRPr lang="en-CH"/>
           </a:p>
@@ -3054,7 +3138,7 @@
           <a:p>
             <a:fld id="{EE0C7D1E-2B42-4CCE-B486-B0C46991BC95}" type="datetimeFigureOut">
               <a:rPr lang="en-CH" smtClean="0"/>
-              <a:t>01/20/2025</a:t>
+              <a:t>01/21/2025</a:t>
             </a:fld>
             <a:endParaRPr lang="en-CH"/>
           </a:p>
@@ -3297,7 +3381,7 @@
           <a:p>
             <a:fld id="{EE0C7D1E-2B42-4CCE-B486-B0C46991BC95}" type="datetimeFigureOut">
               <a:rPr lang="en-CH" smtClean="0"/>
-              <a:t>01/20/2025</a:t>
+              <a:t>01/21/2025</a:t>
             </a:fld>
             <a:endParaRPr lang="en-CH"/>
           </a:p>
@@ -3929,15 +4013,15 @@
           <p:nvPr/>
         </p:nvPicPr>
         <p:blipFill>
-          <a:blip r:embed="rId2"/>
+          <a:blip r:embed="rId3"/>
           <a:stretch>
             <a:fillRect/>
           </a:stretch>
         </p:blipFill>
         <p:spPr>
           <a:xfrm>
-            <a:off x="1030448" y="2187370"/>
-            <a:ext cx="3592239" cy="4402648"/>
+            <a:off x="278079" y="2574937"/>
+            <a:ext cx="3196751" cy="3917938"/>
           </a:xfrm>
           <a:prstGeom prst="rect">
             <a:avLst/>
@@ -3959,7 +4043,7 @@
           <p:nvPr/>
         </p:nvPicPr>
         <p:blipFill>
-          <a:blip r:embed="rId3">
+          <a:blip r:embed="rId4">
             <a:extLst>
               <a:ext uri="{28A0092B-C50C-407E-A947-70E740481C1C}">
                 <a14:useLocalDpi xmlns:a14="http://schemas.microsoft.com/office/drawing/2010/main" val="0"/>
@@ -3972,8 +4056,8 @@
         </p:blipFill>
         <p:spPr>
           <a:xfrm>
-            <a:off x="6738858" y="2600425"/>
-            <a:ext cx="3582073" cy="3576537"/>
+            <a:off x="4395495" y="3084690"/>
+            <a:ext cx="2746657" cy="2742412"/>
           </a:xfrm>
           <a:prstGeom prst="rect">
             <a:avLst/>
@@ -3994,7 +4078,7 @@
         </p:nvSpPr>
         <p:spPr>
           <a:xfrm>
-            <a:off x="7955924" y="6176963"/>
+            <a:off x="5194851" y="5856641"/>
             <a:ext cx="1147943" cy="369332"/>
           </a:xfrm>
           <a:prstGeom prst="rect">
@@ -4016,128 +4100,174 @@
           </a:p>
         </p:txBody>
       </p:sp>
-      <mc:AlternateContent xmlns:mc="http://schemas.openxmlformats.org/markup-compatibility/2006">
-        <mc:Choice xmlns:am3d="http://schemas.microsoft.com/office/drawing/2017/model3d" Requires="am3d">
-          <p:graphicFrame>
-            <p:nvGraphicFramePr>
-              <p:cNvPr id="8" name="Modèle 3D 7" descr="Flèche épaisse">
-                <a:extLst>
-                  <a:ext uri="{FF2B5EF4-FFF2-40B4-BE49-F238E27FC236}">
-                    <a16:creationId xmlns:a16="http://schemas.microsoft.com/office/drawing/2014/main" id="{2F49DF68-79C0-FC27-9D3C-41D52B2E21C1}"/>
-                  </a:ext>
-                </a:extLst>
-              </p:cNvPr>
-              <p:cNvGraphicFramePr/>
-              <p:nvPr>
-                <p:extLst>
-                  <p:ext uri="{D42A27DB-BD31-4B8C-83A1-F6EECF244321}">
-                    <p14:modId xmlns:p14="http://schemas.microsoft.com/office/powerpoint/2010/main" val="3330084060"/>
-                  </p:ext>
-                </p:extLst>
-              </p:nvPr>
-            </p:nvGraphicFramePr>
-            <p:xfrm>
-              <a:off x="4239490" y="3362035"/>
-              <a:ext cx="2225964" cy="1663209"/>
-            </p:xfrm>
-            <a:graphic>
-              <a:graphicData uri="http://schemas.microsoft.com/office/drawing/2017/model3d">
-                <am3d:model3d r:embed="rId4">
-                  <am3d:spPr>
-                    <a:xfrm>
-                      <a:off x="0" y="0"/>
-                      <a:ext cx="2225964" cy="1663209"/>
-                    </a:xfrm>
-                    <a:prstGeom prst="rect">
-                      <a:avLst/>
-                    </a:prstGeom>
-                  </am3d:spPr>
-                  <am3d:camera>
-                    <am3d:pos x="0" y="0" z="52684168"/>
-                    <am3d:up dx="0" dy="36000000" dz="0"/>
-                    <am3d:lookAt x="0" y="0" z="0"/>
-                    <am3d:perspective fov="2700000"/>
-                  </am3d:camera>
-                  <am3d:trans>
-                    <am3d:meterPerModelUnit n="6808809" d="1000000"/>
-                    <am3d:preTrans dx="0" dy="-8383130" dz="0"/>
-                    <am3d:scale>
-                      <am3d:sx n="1000000" d="1000000"/>
-                      <am3d:sy n="1000000" d="1000000"/>
-                      <am3d:sz n="1000000" d="1000000"/>
-                    </am3d:scale>
-                    <am3d:rot/>
-                    <am3d:postTrans dx="0" dy="0" dz="0"/>
-                  </am3d:trans>
-                  <am3d:raster rName="Office3DRenderer" rVer="16.0.8326">
-                    <am3d:blip r:embed="rId5"/>
-                  </am3d:raster>
-                  <am3d:objViewport viewportSz="2519740"/>
-                  <am3d:ambientLight>
-                    <am3d:clr>
-                      <a:scrgbClr r="50000" g="50000" b="50000"/>
-                    </am3d:clr>
-                    <am3d:illuminance n="500000" d="1000000"/>
-                  </am3d:ambientLight>
-                  <am3d:ptLight rad="0">
-                    <am3d:clr>
-                      <a:scrgbClr r="100000" g="75000" b="50000"/>
-                    </am3d:clr>
-                    <am3d:intensity n="9765625" d="1000000"/>
-                    <am3d:pos x="21959998" y="70920001" z="16344003"/>
-                  </am3d:ptLight>
-                  <am3d:ptLight rad="0">
-                    <am3d:clr>
-                      <a:scrgbClr r="40000" g="60000" b="95000"/>
-                    </am3d:clr>
-                    <am3d:intensity n="12250000" d="1000000"/>
-                    <am3d:pos x="-37964106" y="51130435" z="57631972"/>
-                  </am3d:ptLight>
-                  <am3d:ptLight rad="0">
-                    <am3d:clr>
-                      <a:scrgbClr r="86837" g="72700" b="100000"/>
-                    </am3d:clr>
-                    <am3d:intensity n="3125000" d="1000000"/>
-                    <am3d:pos x="-37739122" y="58056624" z="-34769649"/>
-                  </am3d:ptLight>
-                </am3d:model3d>
-              </a:graphicData>
-            </a:graphic>
-          </p:graphicFrame>
-        </mc:Choice>
-        <mc:Fallback>
-          <p:pic>
-            <p:nvPicPr>
-              <p:cNvPr id="8" name="Modèle 3D 7" descr="Flèche épaisse">
-                <a:extLst>
-                  <a:ext uri="{FF2B5EF4-FFF2-40B4-BE49-F238E27FC236}">
-                    <a16:creationId xmlns:a16="http://schemas.microsoft.com/office/drawing/2014/main" id="{2F49DF68-79C0-FC27-9D3C-41D52B2E21C1}"/>
-                  </a:ext>
-                </a:extLst>
-              </p:cNvPr>
-              <p:cNvPicPr>
-                <a:picLocks noGrp="1" noRot="1" noChangeAspect="1" noMove="1" noResize="1" noEditPoints="1" noAdjustHandles="1" noChangeArrowheads="1" noChangeShapeType="1" noCrop="1"/>
-              </p:cNvPicPr>
-              <p:nvPr/>
-            </p:nvPicPr>
-            <p:blipFill>
-              <a:blip r:embed="rId5"/>
-              <a:stretch>
-                <a:fillRect/>
-              </a:stretch>
-            </p:blipFill>
-            <p:spPr>
-              <a:xfrm>
-                <a:off x="4239490" y="3362035"/>
-                <a:ext cx="2225964" cy="1663209"/>
-              </a:xfrm>
-              <a:prstGeom prst="rect">
-                <a:avLst/>
-              </a:prstGeom>
-            </p:spPr>
-          </p:pic>
-        </mc:Fallback>
-      </mc:AlternateContent>
+      <p:sp>
+        <p:nvSpPr>
+          <p:cNvPr id="4" name="Flèche : droite 3">
+            <a:extLst>
+              <a:ext uri="{FF2B5EF4-FFF2-40B4-BE49-F238E27FC236}">
+                <a16:creationId xmlns:a16="http://schemas.microsoft.com/office/drawing/2014/main" id="{93C59C48-087E-F911-E79B-D5A66950817D}"/>
+              </a:ext>
+            </a:extLst>
+          </p:cNvPr>
+          <p:cNvSpPr/>
+          <p:nvPr/>
+        </p:nvSpPr>
+        <p:spPr>
+          <a:xfrm>
+            <a:off x="3173795" y="4291589"/>
+            <a:ext cx="978408" cy="484632"/>
+          </a:xfrm>
+          <a:prstGeom prst="rightArrow">
+            <a:avLst/>
+          </a:prstGeom>
+        </p:spPr>
+        <p:style>
+          <a:lnRef idx="2">
+            <a:schemeClr val="accent1">
+              <a:shade val="15000"/>
+            </a:schemeClr>
+          </a:lnRef>
+          <a:fillRef idx="1">
+            <a:schemeClr val="accent1"/>
+          </a:fillRef>
+          <a:effectRef idx="0">
+            <a:schemeClr val="accent1"/>
+          </a:effectRef>
+          <a:fontRef idx="minor">
+            <a:schemeClr val="lt1"/>
+          </a:fontRef>
+        </p:style>
+        <p:txBody>
+          <a:bodyPr rtlCol="0" anchor="ctr"/>
+          <a:lstStyle/>
+          <a:p>
+            <a:pPr algn="ctr"/>
+            <a:endParaRPr lang="fr-CH" dirty="0"/>
+          </a:p>
+        </p:txBody>
+      </p:sp>
+      <p:pic>
+        <p:nvPicPr>
+          <p:cNvPr id="10" name="Image 9" descr="Une image contenant capture d’écran, Appareil de présentation, Appareil électronique, affichage&#10;&#10;Description générée automatiquement">
+            <a:extLst>
+              <a:ext uri="{FF2B5EF4-FFF2-40B4-BE49-F238E27FC236}">
+                <a16:creationId xmlns:a16="http://schemas.microsoft.com/office/drawing/2014/main" id="{FE3B2525-19F5-2469-7EFA-B877CF38920E}"/>
+              </a:ext>
+            </a:extLst>
+          </p:cNvPr>
+          <p:cNvPicPr>
+            <a:picLocks noChangeAspect="1"/>
+          </p:cNvPicPr>
+          <p:nvPr/>
+        </p:nvPicPr>
+        <p:blipFill>
+          <a:blip r:embed="rId5">
+            <a:extLst>
+              <a:ext uri="{28A0092B-C50C-407E-A947-70E740481C1C}">
+                <a14:useLocalDpi xmlns:a14="http://schemas.microsoft.com/office/drawing/2010/main" val="0"/>
+              </a:ext>
+            </a:extLst>
+          </a:blip>
+          <a:stretch>
+            <a:fillRect/>
+          </a:stretch>
+        </p:blipFill>
+        <p:spPr>
+          <a:xfrm>
+            <a:off x="8607143" y="2858105"/>
+            <a:ext cx="2746657" cy="3343363"/>
+          </a:xfrm>
+          <a:prstGeom prst="rect">
+            <a:avLst/>
+          </a:prstGeom>
+        </p:spPr>
+      </p:pic>
+      <p:sp>
+        <p:nvSpPr>
+          <p:cNvPr id="11" name="Flèche : droite 10">
+            <a:extLst>
+              <a:ext uri="{FF2B5EF4-FFF2-40B4-BE49-F238E27FC236}">
+                <a16:creationId xmlns:a16="http://schemas.microsoft.com/office/drawing/2014/main" id="{9124A91E-85D3-BA87-8E66-7BAC4030B3C2}"/>
+              </a:ext>
+            </a:extLst>
+          </p:cNvPr>
+          <p:cNvSpPr/>
+          <p:nvPr/>
+        </p:nvSpPr>
+        <p:spPr>
+          <a:xfrm>
+            <a:off x="7385443" y="4291589"/>
+            <a:ext cx="978408" cy="484632"/>
+          </a:xfrm>
+          <a:prstGeom prst="rightArrow">
+            <a:avLst/>
+          </a:prstGeom>
+        </p:spPr>
+        <p:style>
+          <a:lnRef idx="2">
+            <a:schemeClr val="accent1">
+              <a:shade val="15000"/>
+            </a:schemeClr>
+          </a:lnRef>
+          <a:fillRef idx="1">
+            <a:schemeClr val="accent1"/>
+          </a:fillRef>
+          <a:effectRef idx="0">
+            <a:schemeClr val="accent1"/>
+          </a:effectRef>
+          <a:fontRef idx="minor">
+            <a:schemeClr val="lt1"/>
+          </a:fontRef>
+        </p:style>
+        <p:txBody>
+          <a:bodyPr rtlCol="0" anchor="ctr"/>
+          <a:lstStyle/>
+          <a:p>
+            <a:pPr algn="ctr"/>
+            <a:endParaRPr lang="fr-CH" dirty="0"/>
+          </a:p>
+        </p:txBody>
+      </p:sp>
+      <p:sp>
+        <p:nvSpPr>
+          <p:cNvPr id="12" name="ZoneTexte 11">
+            <a:extLst>
+              <a:ext uri="{FF2B5EF4-FFF2-40B4-BE49-F238E27FC236}">
+                <a16:creationId xmlns:a16="http://schemas.microsoft.com/office/drawing/2014/main" id="{34FF21E4-6C85-87B2-0A96-78712715FE9A}"/>
+              </a:ext>
+            </a:extLst>
+          </p:cNvPr>
+          <p:cNvSpPr txBox="1"/>
+          <p:nvPr/>
+        </p:nvSpPr>
+        <p:spPr>
+          <a:xfrm>
+            <a:off x="9162684" y="6225973"/>
+            <a:ext cx="1499898" cy="369332"/>
+          </a:xfrm>
+          <a:prstGeom prst="rect">
+            <a:avLst/>
+          </a:prstGeom>
+          <a:noFill/>
+        </p:spPr>
+        <p:txBody>
+          <a:bodyPr wrap="none" rtlCol="0">
+            <a:spAutoFit/>
+          </a:bodyPr>
+          <a:lstStyle/>
+          <a:p>
+            <a:r>
+              <a:rPr lang="de-CH" dirty="0"/>
+              <a:t>Final </a:t>
+            </a:r>
+            <a:r>
+              <a:rPr lang="de-CH" dirty="0" err="1"/>
+              <a:t>Product</a:t>
+            </a:r>
+            <a:endParaRPr lang="fr-CH" dirty="0"/>
+          </a:p>
+        </p:txBody>
+      </p:sp>
     </p:spTree>
     <p:extLst>
       <p:ext uri="{BB962C8B-B14F-4D97-AF65-F5344CB8AC3E}">
@@ -5271,6 +5401,14 @@
 <file path=ppt/slides/slide6.xml><?xml version="1.0" encoding="utf-8"?>
 <p:sld xmlns:a="http://schemas.openxmlformats.org/drawingml/2006/main" xmlns:r="http://schemas.openxmlformats.org/officeDocument/2006/relationships" xmlns:p="http://schemas.openxmlformats.org/presentationml/2006/main">
   <p:cSld>
+    <p:bg>
+      <p:bgPr>
+        <a:solidFill>
+          <a:schemeClr val="bg1"/>
+        </a:solidFill>
+        <a:effectLst/>
+      </p:bgPr>
+    </p:bg>
     <p:spTree>
       <p:nvGrpSpPr>
         <p:cNvPr id="1" name=""/>
@@ -5285,104 +5423,54 @@
           <a:chExt cx="0" cy="0"/>
         </a:xfrm>
       </p:grpSpPr>
-      <p:sp>
-        <p:nvSpPr>
-          <p:cNvPr id="2" name="Titre 1">
-            <a:extLst>
-              <a:ext uri="{FF2B5EF4-FFF2-40B4-BE49-F238E27FC236}">
-                <a16:creationId xmlns:a16="http://schemas.microsoft.com/office/drawing/2014/main" id="{D7DA4AAF-BD7B-1F8D-6C12-DE620BA1C23E}"/>
-              </a:ext>
-            </a:extLst>
-          </p:cNvPr>
-          <p:cNvSpPr>
-            <a:spLocks noGrp="1"/>
-          </p:cNvSpPr>
-          <p:nvPr>
-            <p:ph type="title"/>
-          </p:nvPr>
-        </p:nvSpPr>
-        <p:spPr/>
-        <p:txBody>
-          <a:bodyPr>
-            <a:normAutofit/>
-          </a:bodyPr>
-          <a:lstStyle/>
-          <a:p>
-            <a:r>
-              <a:rPr lang="de-CH" dirty="0" err="1"/>
-              <a:t>Thank</a:t>
-            </a:r>
-            <a:r>
-              <a:rPr lang="de-CH" dirty="0"/>
-              <a:t> </a:t>
-            </a:r>
-            <a:r>
-              <a:rPr lang="de-CH" dirty="0" err="1"/>
-              <a:t>you</a:t>
-            </a:r>
-            <a:r>
-              <a:rPr lang="de-CH" dirty="0"/>
-              <a:t> </a:t>
-            </a:r>
-            <a:r>
-              <a:rPr lang="de-CH" dirty="0" err="1"/>
-              <a:t>for</a:t>
-            </a:r>
-            <a:r>
-              <a:rPr lang="de-CH" dirty="0"/>
-              <a:t> </a:t>
-            </a:r>
-            <a:r>
-              <a:rPr lang="de-CH" dirty="0" err="1"/>
-              <a:t>your</a:t>
-            </a:r>
-            <a:r>
-              <a:rPr lang="de-CH" dirty="0"/>
-              <a:t> </a:t>
-            </a:r>
-            <a:r>
-              <a:rPr lang="de-CH" dirty="0" err="1"/>
-              <a:t>attention</a:t>
-            </a:r>
-            <a:br>
-              <a:rPr lang="de-CH" dirty="0"/>
-            </a:br>
-            <a:r>
-              <a:rPr lang="de-CH" sz="3200" dirty="0"/>
-              <a:t>Questions?</a:t>
-            </a:r>
-            <a:endParaRPr lang="fr-CH" dirty="0"/>
-          </a:p>
-        </p:txBody>
-      </p:sp>
-      <p:sp>
-        <p:nvSpPr>
-          <p:cNvPr id="3" name="Espace réservé du contenu 2">
-            <a:extLst>
-              <a:ext uri="{FF2B5EF4-FFF2-40B4-BE49-F238E27FC236}">
-                <a16:creationId xmlns:a16="http://schemas.microsoft.com/office/drawing/2014/main" id="{91DEC5C9-717D-569B-4D2E-6A6AE1D567D4}"/>
-              </a:ext>
-            </a:extLst>
-          </p:cNvPr>
-          <p:cNvSpPr>
-            <a:spLocks noGrp="1"/>
-          </p:cNvSpPr>
+      <p:pic>
+        <p:nvPicPr>
+          <p:cNvPr id="1026" name="Picture 2">
+            <a:extLst>
+              <a:ext uri="{FF2B5EF4-FFF2-40B4-BE49-F238E27FC236}">
+                <a16:creationId xmlns:a16="http://schemas.microsoft.com/office/drawing/2014/main" id="{072C7778-2549-0253-382F-2A50407A9ECB}"/>
+              </a:ext>
+            </a:extLst>
+          </p:cNvPr>
+          <p:cNvPicPr>
+            <a:picLocks noGrp="1" noChangeAspect="1" noChangeArrowheads="1"/>
+          </p:cNvPicPr>
           <p:nvPr>
             <p:ph idx="1"/>
           </p:nvPr>
-        </p:nvSpPr>
-        <p:spPr/>
-        <p:txBody>
-          <a:bodyPr/>
-          <a:lstStyle/>
-          <a:p>
-            <a:pPr marL="0" indent="0">
-              <a:buNone/>
-            </a:pPr>
-            <a:endParaRPr lang="fr-CH" dirty="0"/>
-          </a:p>
-        </p:txBody>
-      </p:sp>
+        </p:nvPicPr>
+        <p:blipFill>
+          <a:blip r:embed="rId2">
+            <a:extLst>
+              <a:ext uri="{28A0092B-C50C-407E-A947-70E740481C1C}">
+                <a14:useLocalDpi xmlns:a14="http://schemas.microsoft.com/office/drawing/2010/main" val="0"/>
+              </a:ext>
+            </a:extLst>
+          </a:blip>
+          <a:stretch>
+            <a:fillRect/>
+          </a:stretch>
+        </p:blipFill>
+        <p:spPr bwMode="auto">
+          <a:xfrm>
+            <a:off x="1891420" y="643466"/>
+            <a:ext cx="8409159" cy="5571067"/>
+          </a:xfrm>
+          <a:prstGeom prst="rect">
+            <a:avLst/>
+          </a:prstGeom>
+          <a:noFill/>
+          <a:extLst>
+            <a:ext uri="{909E8E84-426E-40DD-AFC4-6F175D3DCCD1}">
+              <a14:hiddenFill xmlns:a14="http://schemas.microsoft.com/office/drawing/2010/main">
+                <a:solidFill>
+                  <a:srgbClr val="FFFFFF"/>
+                </a:solidFill>
+              </a14:hiddenFill>
+            </a:ext>
+          </a:extLst>
+        </p:spPr>
+      </p:pic>
     </p:spTree>
     <p:extLst>
       <p:ext uri="{BB962C8B-B14F-4D97-AF65-F5344CB8AC3E}">

</xml_diff>

<commit_message>
Update the PowerPoint Presentation
</commit_message>
<xml_diff>
--- a/recources/Final_Presentation.pptx
+++ b/recources/Final_Presentation.pptx
@@ -3955,7 +3955,7 @@
           <a:p>
             <a:r>
               <a:rPr lang="en-US" dirty="0"/>
-              <a:t>Recap: Vision</a:t>
+              <a:t>Methodology</a:t>
             </a:r>
             <a:endParaRPr lang="en-CH" dirty="0"/>
           </a:p>
@@ -4704,30 +4704,48 @@
           <a:lstStyle/>
           <a:p>
             <a:r>
+              <a:rPr lang="de-CH" sz="2200" dirty="0" err="1"/>
+              <a:t>Build</a:t>
+            </a:r>
+            <a:r>
               <a:rPr lang="de-CH" sz="2200" dirty="0"/>
-              <a:t>Input</a:t>
-            </a:r>
-          </a:p>
-          <a:p>
+              <a:t> Systems (</a:t>
+            </a:r>
+            <a:r>
+              <a:rPr lang="de-CH" sz="2200" dirty="0" err="1"/>
+              <a:t>CMake</a:t>
+            </a:r>
             <a:r>
               <a:rPr lang="de-CH" sz="2200" dirty="0"/>
-              <a:t>Libraries</a:t>
-            </a:r>
+              <a:t>)</a:t>
+            </a:r>
+          </a:p>
+          <a:p>
+            <a:r>
+              <a:rPr lang="de-CH" sz="2200" dirty="0"/>
+              <a:t>Buttons</a:t>
+            </a:r>
+          </a:p>
+          <a:p>
+            <a:r>
+              <a:rPr lang="de-CH" sz="2200" dirty="0" err="1"/>
+              <a:t>Displaying</a:t>
+            </a:r>
+            <a:r>
+              <a:rPr lang="de-CH" sz="2200" dirty="0"/>
+              <a:t> </a:t>
+            </a:r>
+            <a:r>
+              <a:rPr lang="de-CH" sz="2200" dirty="0" err="1"/>
+              <a:t>bitmaps</a:t>
+            </a:r>
+            <a:endParaRPr lang="de-CH" sz="2200" dirty="0"/>
           </a:p>
           <a:p>
             <a:r>
               <a:rPr lang="de-CH" sz="2200" dirty="0"/>
               <a:t>Music</a:t>
             </a:r>
-          </a:p>
-          <a:p>
-            <a:endParaRPr lang="de-CH" sz="2200" dirty="0"/>
-          </a:p>
-          <a:p>
-            <a:endParaRPr lang="de-CH" sz="2200" dirty="0"/>
-          </a:p>
-          <a:p>
-            <a:endParaRPr lang="fr-CH" sz="2200" dirty="0"/>
           </a:p>
         </p:txBody>
       </p:sp>

</xml_diff>